<commit_message>
Added the audio file
</commit_message>
<xml_diff>
--- a/What’s in a Name.pptx
+++ b/What’s in a Name.pptx
@@ -526,7 +526,7 @@
           <a:p>
             <a:fld id="{BAFE54DC-5661-417D-B7C7-C81BD4791878}" type="datetimeFigureOut">
               <a:rPr lang="en-US" smtClean="0"/>
-              <a:t>2/8/2018</a:t>
+              <a:t>2/9/2018</a:t>
             </a:fld>
             <a:endParaRPr lang="en-US"/>
           </a:p>
@@ -705,7 +705,7 @@
           <a:p>
             <a:fld id="{BAFE54DC-5661-417D-B7C7-C81BD4791878}" type="datetimeFigureOut">
               <a:rPr lang="en-US" smtClean="0"/>
-              <a:t>2/8/2018</a:t>
+              <a:t>2/9/2018</a:t>
             </a:fld>
             <a:endParaRPr lang="en-US"/>
           </a:p>
@@ -885,7 +885,7 @@
           <a:p>
             <a:fld id="{BAFE54DC-5661-417D-B7C7-C81BD4791878}" type="datetimeFigureOut">
               <a:rPr lang="en-US" smtClean="0"/>
-              <a:t>2/8/2018</a:t>
+              <a:t>2/9/2018</a:t>
             </a:fld>
             <a:endParaRPr lang="en-US"/>
           </a:p>
@@ -1055,7 +1055,7 @@
           <a:p>
             <a:fld id="{BAFE54DC-5661-417D-B7C7-C81BD4791878}" type="datetimeFigureOut">
               <a:rPr lang="en-US" smtClean="0"/>
-              <a:t>2/8/2018</a:t>
+              <a:t>2/9/2018</a:t>
             </a:fld>
             <a:endParaRPr lang="en-US"/>
           </a:p>
@@ -1368,7 +1368,7 @@
           <a:p>
             <a:fld id="{BAFE54DC-5661-417D-B7C7-C81BD4791878}" type="datetimeFigureOut">
               <a:rPr lang="en-US" smtClean="0"/>
-              <a:t>2/8/2018</a:t>
+              <a:t>2/9/2018</a:t>
             </a:fld>
             <a:endParaRPr lang="en-US"/>
           </a:p>
@@ -1754,7 +1754,7 @@
           <a:p>
             <a:fld id="{BAFE54DC-5661-417D-B7C7-C81BD4791878}" type="datetimeFigureOut">
               <a:rPr lang="en-US" smtClean="0"/>
-              <a:t>2/8/2018</a:t>
+              <a:t>2/9/2018</a:t>
             </a:fld>
             <a:endParaRPr lang="en-US"/>
           </a:p>
@@ -2188,7 +2188,7 @@
           <a:p>
             <a:fld id="{BAFE54DC-5661-417D-B7C7-C81BD4791878}" type="datetimeFigureOut">
               <a:rPr lang="en-US" smtClean="0"/>
-              <a:t>2/8/2018</a:t>
+              <a:t>2/9/2018</a:t>
             </a:fld>
             <a:endParaRPr lang="en-US"/>
           </a:p>
@@ -2306,7 +2306,7 @@
           <a:p>
             <a:fld id="{BAFE54DC-5661-417D-B7C7-C81BD4791878}" type="datetimeFigureOut">
               <a:rPr lang="en-US" smtClean="0"/>
-              <a:t>2/8/2018</a:t>
+              <a:t>2/9/2018</a:t>
             </a:fld>
             <a:endParaRPr lang="en-US"/>
           </a:p>
@@ -2401,7 +2401,7 @@
           <a:p>
             <a:fld id="{BAFE54DC-5661-417D-B7C7-C81BD4791878}" type="datetimeFigureOut">
               <a:rPr lang="en-US" smtClean="0"/>
-              <a:t>2/8/2018</a:t>
+              <a:t>2/9/2018</a:t>
             </a:fld>
             <a:endParaRPr lang="en-US"/>
           </a:p>
@@ -2751,7 +2751,7 @@
           <a:p>
             <a:fld id="{BAFE54DC-5661-417D-B7C7-C81BD4791878}" type="datetimeFigureOut">
               <a:rPr lang="en-US" smtClean="0"/>
-              <a:t>2/8/2018</a:t>
+              <a:t>2/9/2018</a:t>
             </a:fld>
             <a:endParaRPr lang="en-US"/>
           </a:p>
@@ -3176,7 +3176,7 @@
           <a:p>
             <a:fld id="{BAFE54DC-5661-417D-B7C7-C81BD4791878}" type="datetimeFigureOut">
               <a:rPr lang="en-US" smtClean="0"/>
-              <a:t>2/8/2018</a:t>
+              <a:t>2/9/2018</a:t>
             </a:fld>
             <a:endParaRPr lang="en-US"/>
           </a:p>
@@ -3457,7 +3457,7 @@
           <a:p>
             <a:fld id="{BAFE54DC-5661-417D-B7C7-C81BD4791878}" type="datetimeFigureOut">
               <a:rPr lang="en-US" smtClean="0"/>
-              <a:t>2/8/2018</a:t>
+              <a:t>2/9/2018</a:t>
             </a:fld>
             <a:endParaRPr lang="en-US"/>
           </a:p>
@@ -4976,6 +4976,44 @@
           </a:p>
         </p:txBody>
       </p:sp>
+      <p:pic>
+        <p:nvPicPr>
+          <p:cNvPr id="4" name="tomclip-1947 HITS ARCHIVE_ Linda - Buddy Clark &amp; Ray Noble (#1 hit)-NRZeA8n0LXM AETrim1518207172602">
+            <a:hlinkClick r:id="" action="ppaction://media"/>
+            <a:extLst>
+              <a:ext uri="{FF2B5EF4-FFF2-40B4-BE49-F238E27FC236}">
+                <a16:creationId xmlns:a16="http://schemas.microsoft.com/office/drawing/2014/main" id="{A28476BB-3AA8-4CB0-94ED-863769FCE8CC}"/>
+              </a:ext>
+            </a:extLst>
+          </p:cNvPr>
+          <p:cNvPicPr>
+            <a:picLocks noChangeAspect="1"/>
+          </p:cNvPicPr>
+          <p:nvPr>
+            <a:audioFile r:link="rId2"/>
+            <p:extLst>
+              <p:ext uri="{DAA4B4D4-6D71-4841-9C94-3DE7FCFB9230}">
+                <p14:media xmlns:p14="http://schemas.microsoft.com/office/powerpoint/2010/main" r:embed="rId1"/>
+              </p:ext>
+            </p:extLst>
+          </p:nvPr>
+        </p:nvPicPr>
+        <p:blipFill>
+          <a:blip r:embed="rId4"/>
+          <a:stretch>
+            <a:fillRect/>
+          </a:stretch>
+        </p:blipFill>
+        <p:spPr>
+          <a:xfrm>
+            <a:off x="98425" y="98425"/>
+            <a:ext cx="244475" cy="244475"/>
+          </a:xfrm>
+          <a:prstGeom prst="rect">
+            <a:avLst/>
+          </a:prstGeom>
+        </p:spPr>
+      </p:pic>
     </p:spTree>
     <p:extLst>
       <p:ext uri="{BB962C8B-B14F-4D97-AF65-F5344CB8AC3E}">
@@ -4986,6 +5024,90 @@
   <p:clrMapOvr>
     <a:masterClrMapping/>
   </p:clrMapOvr>
+  <p:timing>
+    <p:tnLst>
+      <p:par>
+        <p:cTn id="1" dur="indefinite" restart="never" nodeType="tmRoot">
+          <p:childTnLst>
+            <p:seq concurrent="1" nextAc="seek">
+              <p:cTn id="2" dur="indefinite" nodeType="mainSeq">
+                <p:childTnLst>
+                  <p:par>
+                    <p:cTn id="3" fill="hold">
+                      <p:stCondLst>
+                        <p:cond delay="indefinite"/>
+                      </p:stCondLst>
+                      <p:childTnLst>
+                        <p:par>
+                          <p:cTn id="4" fill="hold">
+                            <p:stCondLst>
+                              <p:cond delay="0"/>
+                            </p:stCondLst>
+                            <p:childTnLst>
+                              <p:par>
+                                <p:cTn id="5" presetID="1" presetClass="mediacall" presetSubtype="0" fill="hold" nodeType="clickEffect">
+                                  <p:stCondLst>
+                                    <p:cond delay="0"/>
+                                  </p:stCondLst>
+                                  <p:childTnLst>
+                                    <p:cmd type="call" cmd="playFrom(0.0)">
+                                      <p:cBhvr>
+                                        <p:cTn id="6" dur="31582" fill="hold"/>
+                                        <p:tgtEl>
+                                          <p:spTgt spid="4"/>
+                                        </p:tgtEl>
+                                      </p:cBhvr>
+                                    </p:cmd>
+                                  </p:childTnLst>
+                                </p:cTn>
+                              </p:par>
+                            </p:childTnLst>
+                          </p:cTn>
+                        </p:par>
+                      </p:childTnLst>
+                    </p:cTn>
+                  </p:par>
+                </p:childTnLst>
+              </p:cTn>
+              <p:prevCondLst>
+                <p:cond evt="onPrev" delay="0">
+                  <p:tgtEl>
+                    <p:sldTgt/>
+                  </p:tgtEl>
+                </p:cond>
+              </p:prevCondLst>
+              <p:nextCondLst>
+                <p:cond evt="onNext" delay="0">
+                  <p:tgtEl>
+                    <p:sldTgt/>
+                  </p:tgtEl>
+                </p:cond>
+              </p:nextCondLst>
+            </p:seq>
+            <p:audio>
+              <p:cMediaNode vol="80000">
+                <p:cTn id="7" fill="hold" display="0">
+                  <p:stCondLst>
+                    <p:cond delay="indefinite"/>
+                  </p:stCondLst>
+                  <p:endCondLst>
+                    <p:cond evt="onStopAudio" delay="0">
+                      <p:tgtEl>
+                        <p:sldTgt/>
+                      </p:tgtEl>
+                    </p:cond>
+                  </p:endCondLst>
+                </p:cTn>
+                <p:tgtEl>
+                  <p:spTgt spid="4"/>
+                </p:tgtEl>
+              </p:cMediaNode>
+            </p:audio>
+          </p:childTnLst>
+        </p:cTn>
+      </p:par>
+    </p:tnLst>
+  </p:timing>
 </p:sld>
 </file>
 

</xml_diff>

<commit_message>
Added twitter bot info and section for our iPython Notebook .pdf
</commit_message>
<xml_diff>
--- a/What’s in a Name.pptx
+++ b/What’s in a Name.pptx
@@ -17,6 +17,8 @@
     <p:sldId id="263" r:id="rId11"/>
     <p:sldId id="265" r:id="rId12"/>
     <p:sldId id="267" r:id="rId13"/>
+    <p:sldId id="270" r:id="rId14"/>
+    <p:sldId id="271" r:id="rId15"/>
   </p:sldIdLst>
   <p:sldSz cx="12192000" cy="6858000"/>
   <p:notesSz cx="6858000" cy="9144000"/>
@@ -4947,6 +4949,151 @@
 </p:sld>
 </file>
 
+<file path=ppt/slides/slide13.xml><?xml version="1.0" encoding="utf-8"?>
+<p:sld xmlns:a="http://schemas.openxmlformats.org/drawingml/2006/main" xmlns:r="http://schemas.openxmlformats.org/officeDocument/2006/relationships" xmlns:p="http://schemas.openxmlformats.org/presentationml/2006/main">
+  <p:cSld>
+    <p:spTree>
+      <p:nvGrpSpPr>
+        <p:cNvPr id="1" name=""/>
+        <p:cNvGrpSpPr/>
+        <p:nvPr/>
+      </p:nvGrpSpPr>
+      <p:grpSpPr>
+        <a:xfrm>
+          <a:off x="0" y="0"/>
+          <a:ext cx="0" cy="0"/>
+          <a:chOff x="0" y="0"/>
+          <a:chExt cx="0" cy="0"/>
+        </a:xfrm>
+      </p:grpSpPr>
+      <p:sp>
+        <p:nvSpPr>
+          <p:cNvPr id="2" name="Title 1">
+            <a:extLst>
+              <a:ext uri="{FF2B5EF4-FFF2-40B4-BE49-F238E27FC236}">
+                <a16:creationId xmlns:a16="http://schemas.microsoft.com/office/drawing/2014/main" id="{D8E07D75-3A63-42E8-A627-90B8E4F244B0}"/>
+              </a:ext>
+            </a:extLst>
+          </p:cNvPr>
+          <p:cNvSpPr>
+            <a:spLocks noGrp="1"/>
+          </p:cNvSpPr>
+          <p:nvPr>
+            <p:ph type="title"/>
+          </p:nvPr>
+        </p:nvSpPr>
+        <p:spPr/>
+        <p:txBody>
+          <a:bodyPr/>
+          <a:lstStyle/>
+          <a:p>
+            <a:r>
+              <a:rPr lang="en-US" dirty="0"/>
+              <a:t>Appendix</a:t>
+            </a:r>
+          </a:p>
+        </p:txBody>
+      </p:sp>
+    </p:spTree>
+    <p:extLst>
+      <p:ext uri="{BB962C8B-B14F-4D97-AF65-F5344CB8AC3E}">
+        <p14:creationId xmlns:p14="http://schemas.microsoft.com/office/powerpoint/2010/main" val="271915359"/>
+      </p:ext>
+    </p:extLst>
+  </p:cSld>
+  <p:clrMapOvr>
+    <a:masterClrMapping/>
+  </p:clrMapOvr>
+</p:sld>
+</file>
+
+<file path=ppt/slides/slide14.xml><?xml version="1.0" encoding="utf-8"?>
+<p:sld xmlns:a="http://schemas.openxmlformats.org/drawingml/2006/main" xmlns:r="http://schemas.openxmlformats.org/officeDocument/2006/relationships" xmlns:p="http://schemas.openxmlformats.org/presentationml/2006/main">
+  <p:cSld>
+    <p:spTree>
+      <p:nvGrpSpPr>
+        <p:cNvPr id="1" name=""/>
+        <p:cNvGrpSpPr/>
+        <p:nvPr/>
+      </p:nvGrpSpPr>
+      <p:grpSpPr>
+        <a:xfrm>
+          <a:off x="0" y="0"/>
+          <a:ext cx="0" cy="0"/>
+          <a:chOff x="0" y="0"/>
+          <a:chExt cx="0" cy="0"/>
+        </a:xfrm>
+      </p:grpSpPr>
+      <p:sp>
+        <p:nvSpPr>
+          <p:cNvPr id="2" name="Title 1">
+            <a:extLst>
+              <a:ext uri="{FF2B5EF4-FFF2-40B4-BE49-F238E27FC236}">
+                <a16:creationId xmlns:a16="http://schemas.microsoft.com/office/drawing/2014/main" id="{3EF97BE8-2A38-4C85-BD30-4FFFC7AF867D}"/>
+              </a:ext>
+            </a:extLst>
+          </p:cNvPr>
+          <p:cNvSpPr>
+            <a:spLocks noGrp="1"/>
+          </p:cNvSpPr>
+          <p:nvPr>
+            <p:ph type="title"/>
+          </p:nvPr>
+        </p:nvSpPr>
+        <p:spPr/>
+        <p:txBody>
+          <a:bodyPr/>
+          <a:lstStyle/>
+          <a:p>
+            <a:r>
+              <a:rPr lang="en-US" dirty="0" err="1"/>
+              <a:t>iPython</a:t>
+            </a:r>
+            <a:r>
+              <a:rPr lang="en-US" dirty="0"/>
+              <a:t> Notebooks</a:t>
+            </a:r>
+          </a:p>
+        </p:txBody>
+      </p:sp>
+      <p:sp>
+        <p:nvSpPr>
+          <p:cNvPr id="3" name="Content Placeholder 2">
+            <a:extLst>
+              <a:ext uri="{FF2B5EF4-FFF2-40B4-BE49-F238E27FC236}">
+                <a16:creationId xmlns:a16="http://schemas.microsoft.com/office/drawing/2014/main" id="{CA81A47B-5DB2-440B-99DE-C3B471606378}"/>
+              </a:ext>
+            </a:extLst>
+          </p:cNvPr>
+          <p:cNvSpPr>
+            <a:spLocks noGrp="1"/>
+          </p:cNvSpPr>
+          <p:nvPr>
+            <p:ph idx="1"/>
+          </p:nvPr>
+        </p:nvSpPr>
+        <p:spPr/>
+        <p:txBody>
+          <a:bodyPr/>
+          <a:lstStyle/>
+          <a:p>
+            <a:endParaRPr lang="en-US" dirty="0"/>
+          </a:p>
+        </p:txBody>
+      </p:sp>
+    </p:spTree>
+    <p:extLst>
+      <p:ext uri="{BB962C8B-B14F-4D97-AF65-F5344CB8AC3E}">
+        <p14:creationId xmlns:p14="http://schemas.microsoft.com/office/powerpoint/2010/main" val="499625023"/>
+      </p:ext>
+    </p:extLst>
+  </p:cSld>
+  <p:clrMapOvr>
+    <a:masterClrMapping/>
+  </p:clrMapOvr>
+</p:sld>
+</file>
+
 <file path=ppt/slides/slide2.xml><?xml version="1.0" encoding="utf-8"?>
 <p:sld xmlns:a="http://schemas.openxmlformats.org/drawingml/2006/main" xmlns:r="http://schemas.openxmlformats.org/officeDocument/2006/relationships" xmlns:p="http://schemas.openxmlformats.org/presentationml/2006/main">
   <p:cSld>
@@ -6647,7 +6794,7 @@
         </p:blipFill>
         <p:spPr>
           <a:xfrm>
-            <a:off x="1" y="1294667"/>
+            <a:off x="0" y="795096"/>
             <a:ext cx="5999116" cy="4635681"/>
           </a:xfrm>
         </p:spPr>
@@ -6680,7 +6827,7 @@
         </p:blipFill>
         <p:spPr>
           <a:xfrm>
-            <a:off x="6192884" y="1294668"/>
+            <a:off x="6133707" y="795096"/>
             <a:ext cx="5999116" cy="4635680"/>
           </a:xfrm>
           <a:prstGeom prst="rect">
@@ -6688,6 +6835,58 @@
           </a:prstGeom>
         </p:spPr>
       </p:pic>
+      <p:sp>
+        <p:nvSpPr>
+          <p:cNvPr id="3" name="TextBox 2">
+            <a:extLst>
+              <a:ext uri="{FF2B5EF4-FFF2-40B4-BE49-F238E27FC236}">
+                <a16:creationId xmlns:a16="http://schemas.microsoft.com/office/drawing/2014/main" id="{E6CF9FCE-7847-41B7-96DC-D77196D8024E}"/>
+              </a:ext>
+            </a:extLst>
+          </p:cNvPr>
+          <p:cNvSpPr txBox="1"/>
+          <p:nvPr/>
+        </p:nvSpPr>
+        <p:spPr>
+          <a:xfrm>
+            <a:off x="633045" y="5688496"/>
+            <a:ext cx="5999116" cy="923330"/>
+          </a:xfrm>
+          <a:prstGeom prst="rect">
+            <a:avLst/>
+          </a:prstGeom>
+          <a:noFill/>
+        </p:spPr>
+        <p:txBody>
+          <a:bodyPr wrap="square" rtlCol="0">
+            <a:spAutoFit/>
+          </a:bodyPr>
+          <a:lstStyle/>
+          <a:p>
+            <a:r>
+              <a:rPr lang="en-US" dirty="0"/>
+              <a:t>Twitter:  @</a:t>
+            </a:r>
+            <a:r>
+              <a:rPr lang="en-US" dirty="0" err="1"/>
+              <a:t>RocChalkChicken</a:t>
+            </a:r>
+            <a:endParaRPr lang="en-US" dirty="0"/>
+          </a:p>
+          <a:p>
+            <a:r>
+              <a:rPr lang="en-US" dirty="0"/>
+              <a:t>#Name_Male_XX_19XX  or   #Name_Female_XX_19XX</a:t>
+            </a:r>
+          </a:p>
+          <a:p>
+            <a:r>
+              <a:rPr lang="en-US" dirty="0"/>
+              <a:t>#Scott_Male_KS_1969</a:t>
+            </a:r>
+          </a:p>
+        </p:txBody>
+      </p:sp>
     </p:spTree>
     <p:extLst>
       <p:ext uri="{BB962C8B-B14F-4D97-AF65-F5344CB8AC3E}">

</xml_diff>